<commit_message>
.ppt reuniao da ultima sexta
</commit_message>
<xml_diff>
--- a/papers/.ppt/TimeSeriesCV_03052024.pptx
+++ b/papers/.ppt/TimeSeriesCV_03052024.pptx
@@ -17,6 +17,7 @@
     <p:sldId id="321" r:id="rId11"/>
     <p:sldId id="322" r:id="rId12"/>
     <p:sldId id="316" r:id="rId13"/>
+    <p:sldId id="325" r:id="rId14"/>
   </p:sldIdLst>
   <p:sldSz cx="12192000" cy="6858000"/>
   <p:notesSz cx="6858000" cy="9144000"/>
@@ -136,6 +137,7 @@
             <p14:sldId id="321"/>
             <p14:sldId id="322"/>
             <p14:sldId id="316"/>
+            <p14:sldId id="325"/>
           </p14:sldIdLst>
         </p14:section>
       </p14:sectionLst>
@@ -294,7 +296,7 @@
           <a:p>
             <a:fld id="{0FEE928B-C7F0-48C6-BE5C-4C114E091DF6}" type="datetimeFigureOut">
               <a:rPr lang="en-US" smtClean="0"/>
-              <a:t>03-May-24</a:t>
+              <a:t>06-May-24</a:t>
             </a:fld>
             <a:endParaRPr lang="en-US"/>
           </a:p>
@@ -492,7 +494,7 @@
           <a:p>
             <a:fld id="{0FEE928B-C7F0-48C6-BE5C-4C114E091DF6}" type="datetimeFigureOut">
               <a:rPr lang="en-US" smtClean="0"/>
-              <a:t>03-May-24</a:t>
+              <a:t>06-May-24</a:t>
             </a:fld>
             <a:endParaRPr lang="en-US"/>
           </a:p>
@@ -700,7 +702,7 @@
           <a:p>
             <a:fld id="{0FEE928B-C7F0-48C6-BE5C-4C114E091DF6}" type="datetimeFigureOut">
               <a:rPr lang="en-US" smtClean="0"/>
-              <a:t>03-May-24</a:t>
+              <a:t>06-May-24</a:t>
             </a:fld>
             <a:endParaRPr lang="en-US"/>
           </a:p>
@@ -898,7 +900,7 @@
           <a:p>
             <a:fld id="{0FEE928B-C7F0-48C6-BE5C-4C114E091DF6}" type="datetimeFigureOut">
               <a:rPr lang="en-US" smtClean="0"/>
-              <a:t>03-May-24</a:t>
+              <a:t>06-May-24</a:t>
             </a:fld>
             <a:endParaRPr lang="en-US"/>
           </a:p>
@@ -1173,7 +1175,7 @@
           <a:p>
             <a:fld id="{0FEE928B-C7F0-48C6-BE5C-4C114E091DF6}" type="datetimeFigureOut">
               <a:rPr lang="en-US" smtClean="0"/>
-              <a:t>03-May-24</a:t>
+              <a:t>06-May-24</a:t>
             </a:fld>
             <a:endParaRPr lang="en-US"/>
           </a:p>
@@ -1438,7 +1440,7 @@
           <a:p>
             <a:fld id="{0FEE928B-C7F0-48C6-BE5C-4C114E091DF6}" type="datetimeFigureOut">
               <a:rPr lang="en-US" smtClean="0"/>
-              <a:t>03-May-24</a:t>
+              <a:t>06-May-24</a:t>
             </a:fld>
             <a:endParaRPr lang="en-US"/>
           </a:p>
@@ -1850,7 +1852,7 @@
           <a:p>
             <a:fld id="{0FEE928B-C7F0-48C6-BE5C-4C114E091DF6}" type="datetimeFigureOut">
               <a:rPr lang="en-US" smtClean="0"/>
-              <a:t>03-May-24</a:t>
+              <a:t>06-May-24</a:t>
             </a:fld>
             <a:endParaRPr lang="en-US"/>
           </a:p>
@@ -1991,7 +1993,7 @@
           <a:p>
             <a:fld id="{0FEE928B-C7F0-48C6-BE5C-4C114E091DF6}" type="datetimeFigureOut">
               <a:rPr lang="en-US" smtClean="0"/>
-              <a:t>03-May-24</a:t>
+              <a:t>06-May-24</a:t>
             </a:fld>
             <a:endParaRPr lang="en-US"/>
           </a:p>
@@ -2104,7 +2106,7 @@
           <a:p>
             <a:fld id="{0FEE928B-C7F0-48C6-BE5C-4C114E091DF6}" type="datetimeFigureOut">
               <a:rPr lang="en-US" smtClean="0"/>
-              <a:t>03-May-24</a:t>
+              <a:t>06-May-24</a:t>
             </a:fld>
             <a:endParaRPr lang="en-US"/>
           </a:p>
@@ -2415,7 +2417,7 @@
           <a:p>
             <a:fld id="{0FEE928B-C7F0-48C6-BE5C-4C114E091DF6}" type="datetimeFigureOut">
               <a:rPr lang="en-US" smtClean="0"/>
-              <a:t>03-May-24</a:t>
+              <a:t>06-May-24</a:t>
             </a:fld>
             <a:endParaRPr lang="en-US"/>
           </a:p>
@@ -2703,7 +2705,7 @@
           <a:p>
             <a:fld id="{0FEE928B-C7F0-48C6-BE5C-4C114E091DF6}" type="datetimeFigureOut">
               <a:rPr lang="en-US" smtClean="0"/>
-              <a:t>03-May-24</a:t>
+              <a:t>06-May-24</a:t>
             </a:fld>
             <a:endParaRPr lang="en-US"/>
           </a:p>
@@ -2944,7 +2946,7 @@
           <a:p>
             <a:fld id="{0FEE928B-C7F0-48C6-BE5C-4C114E091DF6}" type="datetimeFigureOut">
               <a:rPr lang="en-US" smtClean="0"/>
-              <a:t>03-May-24</a:t>
+              <a:t>06-May-24</a:t>
             </a:fld>
             <a:endParaRPr lang="en-US"/>
           </a:p>
@@ -3833,6 +3835,119 @@
 </p:sld>
 </file>
 
+<file path=ppt/slides/slide13.xml><?xml version="1.0" encoding="utf-8"?>
+<p:sld xmlns:a="http://schemas.openxmlformats.org/drawingml/2006/main" xmlns:r="http://schemas.openxmlformats.org/officeDocument/2006/relationships" xmlns:p="http://schemas.openxmlformats.org/presentationml/2006/main">
+  <p:cSld>
+    <p:spTree>
+      <p:nvGrpSpPr>
+        <p:cNvPr id="1" name=""/>
+        <p:cNvGrpSpPr/>
+        <p:nvPr/>
+      </p:nvGrpSpPr>
+      <p:grpSpPr>
+        <a:xfrm>
+          <a:off x="0" y="0"/>
+          <a:ext cx="0" cy="0"/>
+          <a:chOff x="0" y="0"/>
+          <a:chExt cx="0" cy="0"/>
+        </a:xfrm>
+      </p:grpSpPr>
+      <p:sp>
+        <p:nvSpPr>
+          <p:cNvPr id="2" name="Title 1">
+            <a:extLst>
+              <a:ext uri="{FF2B5EF4-FFF2-40B4-BE49-F238E27FC236}">
+                <a16:creationId xmlns:a16="http://schemas.microsoft.com/office/drawing/2014/main" id="{40418348-F06C-4B32-A8DF-15AA5AF6BE42}"/>
+              </a:ext>
+            </a:extLst>
+          </p:cNvPr>
+          <p:cNvSpPr>
+            <a:spLocks noGrp="1"/>
+          </p:cNvSpPr>
+          <p:nvPr>
+            <p:ph type="title"/>
+          </p:nvPr>
+        </p:nvSpPr>
+        <p:spPr/>
+        <p:txBody>
+          <a:bodyPr/>
+          <a:lstStyle/>
+          <a:p>
+            <a:r>
+              <a:rPr lang="en-US" dirty="0" err="1"/>
+              <a:t>Questões</a:t>
+            </a:r>
+            <a:r>
+              <a:rPr lang="en-US" dirty="0"/>
+              <a:t>…</a:t>
+            </a:r>
+          </a:p>
+        </p:txBody>
+      </p:sp>
+      <p:sp>
+        <p:nvSpPr>
+          <p:cNvPr id="3" name="Content Placeholder 2">
+            <a:extLst>
+              <a:ext uri="{FF2B5EF4-FFF2-40B4-BE49-F238E27FC236}">
+                <a16:creationId xmlns:a16="http://schemas.microsoft.com/office/drawing/2014/main" id="{1C3624A7-C000-47B3-A158-458A46A60393}"/>
+              </a:ext>
+            </a:extLst>
+          </p:cNvPr>
+          <p:cNvSpPr>
+            <a:spLocks noGrp="1"/>
+          </p:cNvSpPr>
+          <p:nvPr>
+            <p:ph idx="1"/>
+          </p:nvPr>
+        </p:nvSpPr>
+        <p:spPr/>
+        <p:txBody>
+          <a:bodyPr>
+            <a:normAutofit/>
+          </a:bodyPr>
+          <a:lstStyle/>
+          <a:p>
+            <a:r>
+              <a:rPr lang="en-US" sz="2000" dirty="0" err="1"/>
+              <a:t>Temos</a:t>
+            </a:r>
+            <a:r>
+              <a:rPr lang="en-US" sz="2000" dirty="0"/>
+              <a:t> de </a:t>
+            </a:r>
+            <a:r>
+              <a:rPr lang="en-US" sz="2000" dirty="0" err="1"/>
+              <a:t>fazer</a:t>
+            </a:r>
+            <a:r>
+              <a:rPr lang="en-US" sz="2000" dirty="0"/>
+              <a:t> a </a:t>
+            </a:r>
+            <a:r>
+              <a:rPr lang="en-US" sz="2000" dirty="0" err="1"/>
+              <a:t>apresentação</a:t>
+            </a:r>
+            <a:r>
+              <a:rPr lang="en-US" sz="2000"/>
+              <a:t> para o WCCI (?)</a:t>
+            </a:r>
+            <a:endParaRPr lang="en-US" sz="2000" dirty="0"/>
+          </a:p>
+        </p:txBody>
+      </p:sp>
+    </p:spTree>
+    <p:extLst>
+      <p:ext uri="{BB962C8B-B14F-4D97-AF65-F5344CB8AC3E}">
+        <p14:creationId xmlns:p14="http://schemas.microsoft.com/office/powerpoint/2010/main" val="2910016951"/>
+      </p:ext>
+    </p:extLst>
+  </p:cSld>
+  <p:clrMapOvr>
+    <a:masterClrMapping/>
+  </p:clrMapOvr>
+</p:sld>
+</file>
+
 <file path=ppt/slides/slide2.xml><?xml version="1.0" encoding="utf-8"?>
 <p:sld xmlns:a="http://schemas.openxmlformats.org/drawingml/2006/main" xmlns:r="http://schemas.openxmlformats.org/officeDocument/2006/relationships" xmlns:p="http://schemas.openxmlformats.org/presentationml/2006/main">
   <p:cSld>

</xml_diff>